<commit_message>
Update presentation, readme, and Apex export to include application URL and the most updated version of the app
</commit_message>
<xml_diff>
--- a/A New MEAN Stack.pptx
+++ b/A New MEAN Stack.pptx
@@ -6,17 +6,18 @@
   </p:sldMasterIdLst>
   <p:sldIdLst>
     <p:sldId id="256" r:id="rId2"/>
-    <p:sldId id="258" r:id="rId3"/>
-    <p:sldId id="257" r:id="rId4"/>
-    <p:sldId id="262" r:id="rId5"/>
-    <p:sldId id="264" r:id="rId6"/>
-    <p:sldId id="265" r:id="rId7"/>
-    <p:sldId id="259" r:id="rId8"/>
-    <p:sldId id="260" r:id="rId9"/>
-    <p:sldId id="261" r:id="rId10"/>
-    <p:sldId id="263" r:id="rId11"/>
-    <p:sldId id="266" r:id="rId12"/>
-    <p:sldId id="267" r:id="rId13"/>
+    <p:sldId id="268" r:id="rId3"/>
+    <p:sldId id="258" r:id="rId4"/>
+    <p:sldId id="257" r:id="rId5"/>
+    <p:sldId id="262" r:id="rId6"/>
+    <p:sldId id="264" r:id="rId7"/>
+    <p:sldId id="265" r:id="rId8"/>
+    <p:sldId id="259" r:id="rId9"/>
+    <p:sldId id="260" r:id="rId10"/>
+    <p:sldId id="261" r:id="rId11"/>
+    <p:sldId id="263" r:id="rId12"/>
+    <p:sldId id="266" r:id="rId13"/>
+    <p:sldId id="267" r:id="rId14"/>
   </p:sldIdLst>
   <p:sldSz cx="12192000" cy="6858000"/>
   <p:notesSz cx="6858000" cy="9144000"/>
@@ -868,7 +869,7 @@
           <a:p>
             <a:fld id="{CC3B8B2A-A9AF-4D9A-A1FB-4FC30B3F5934}" type="datetimeFigureOut">
               <a:rPr lang="en-US" smtClean="0"/>
-              <a:t>4/27/2015</a:t>
+              <a:t>5/17/2015</a:t>
             </a:fld>
             <a:endParaRPr lang="en-US"/>
           </a:p>
@@ -1119,7 +1120,7 @@
           <a:p>
             <a:fld id="{CC3B8B2A-A9AF-4D9A-A1FB-4FC30B3F5934}" type="datetimeFigureOut">
               <a:rPr lang="en-US" smtClean="0"/>
-              <a:t>4/27/2015</a:t>
+              <a:t>5/17/2015</a:t>
             </a:fld>
             <a:endParaRPr lang="en-US"/>
           </a:p>
@@ -1433,7 +1434,7 @@
           <a:p>
             <a:fld id="{CC3B8B2A-A9AF-4D9A-A1FB-4FC30B3F5934}" type="datetimeFigureOut">
               <a:rPr lang="en-US" smtClean="0"/>
-              <a:t>4/27/2015</a:t>
+              <a:t>5/17/2015</a:t>
             </a:fld>
             <a:endParaRPr lang="en-US"/>
           </a:p>
@@ -1766,7 +1767,7 @@
           <a:p>
             <a:fld id="{CC3B8B2A-A9AF-4D9A-A1FB-4FC30B3F5934}" type="datetimeFigureOut">
               <a:rPr lang="en-US" smtClean="0"/>
-              <a:t>4/27/2015</a:t>
+              <a:t>5/17/2015</a:t>
             </a:fld>
             <a:endParaRPr lang="en-US"/>
           </a:p>
@@ -2080,7 +2081,7 @@
           <a:p>
             <a:fld id="{CC3B8B2A-A9AF-4D9A-A1FB-4FC30B3F5934}" type="datetimeFigureOut">
               <a:rPr lang="en-US" smtClean="0"/>
-              <a:t>4/27/2015</a:t>
+              <a:t>5/17/2015</a:t>
             </a:fld>
             <a:endParaRPr lang="en-US"/>
           </a:p>
@@ -2473,7 +2474,7 @@
           <a:p>
             <a:fld id="{CC3B8B2A-A9AF-4D9A-A1FB-4FC30B3F5934}" type="datetimeFigureOut">
               <a:rPr lang="en-US" smtClean="0"/>
-              <a:t>4/27/2015</a:t>
+              <a:t>5/17/2015</a:t>
             </a:fld>
             <a:endParaRPr lang="en-US"/>
           </a:p>
@@ -2643,7 +2644,7 @@
           <a:p>
             <a:fld id="{CC3B8B2A-A9AF-4D9A-A1FB-4FC30B3F5934}" type="datetimeFigureOut">
               <a:rPr lang="en-US" smtClean="0"/>
-              <a:t>4/27/2015</a:t>
+              <a:t>5/17/2015</a:t>
             </a:fld>
             <a:endParaRPr lang="en-US"/>
           </a:p>
@@ -2823,7 +2824,7 @@
           <a:p>
             <a:fld id="{CC3B8B2A-A9AF-4D9A-A1FB-4FC30B3F5934}" type="datetimeFigureOut">
               <a:rPr lang="en-US" smtClean="0"/>
-              <a:t>4/27/2015</a:t>
+              <a:t>5/17/2015</a:t>
             </a:fld>
             <a:endParaRPr lang="en-US"/>
           </a:p>
@@ -2993,7 +2994,7 @@
           <a:p>
             <a:fld id="{CC3B8B2A-A9AF-4D9A-A1FB-4FC30B3F5934}" type="datetimeFigureOut">
               <a:rPr lang="en-US" smtClean="0"/>
-              <a:t>4/27/2015</a:t>
+              <a:t>5/17/2015</a:t>
             </a:fld>
             <a:endParaRPr lang="en-US"/>
           </a:p>
@@ -3240,7 +3241,7 @@
           <a:p>
             <a:fld id="{CC3B8B2A-A9AF-4D9A-A1FB-4FC30B3F5934}" type="datetimeFigureOut">
               <a:rPr lang="en-US" smtClean="0"/>
-              <a:t>4/27/2015</a:t>
+              <a:t>5/17/2015</a:t>
             </a:fld>
             <a:endParaRPr lang="en-US"/>
           </a:p>
@@ -3472,7 +3473,7 @@
           <a:p>
             <a:fld id="{CC3B8B2A-A9AF-4D9A-A1FB-4FC30B3F5934}" type="datetimeFigureOut">
               <a:rPr lang="en-US" smtClean="0"/>
-              <a:t>4/27/2015</a:t>
+              <a:t>5/17/2015</a:t>
             </a:fld>
             <a:endParaRPr lang="en-US"/>
           </a:p>
@@ -3846,7 +3847,7 @@
           <a:p>
             <a:fld id="{CC3B8B2A-A9AF-4D9A-A1FB-4FC30B3F5934}" type="datetimeFigureOut">
               <a:rPr lang="en-US" smtClean="0"/>
-              <a:t>4/27/2015</a:t>
+              <a:t>5/17/2015</a:t>
             </a:fld>
             <a:endParaRPr lang="en-US"/>
           </a:p>
@@ -3969,7 +3970,7 @@
           <a:p>
             <a:fld id="{CC3B8B2A-A9AF-4D9A-A1FB-4FC30B3F5934}" type="datetimeFigureOut">
               <a:rPr lang="en-US" smtClean="0"/>
-              <a:t>4/27/2015</a:t>
+              <a:t>5/17/2015</a:t>
             </a:fld>
             <a:endParaRPr lang="en-US"/>
           </a:p>
@@ -4064,7 +4065,7 @@
           <a:p>
             <a:fld id="{CC3B8B2A-A9AF-4D9A-A1FB-4FC30B3F5934}" type="datetimeFigureOut">
               <a:rPr lang="en-US" smtClean="0"/>
-              <a:t>4/27/2015</a:t>
+              <a:t>5/17/2015</a:t>
             </a:fld>
             <a:endParaRPr lang="en-US"/>
           </a:p>
@@ -4319,7 +4320,7 @@
           <a:p>
             <a:fld id="{CC3B8B2A-A9AF-4D9A-A1FB-4FC30B3F5934}" type="datetimeFigureOut">
               <a:rPr lang="en-US" smtClean="0"/>
-              <a:t>4/27/2015</a:t>
+              <a:t>5/17/2015</a:t>
             </a:fld>
             <a:endParaRPr lang="en-US"/>
           </a:p>
@@ -4624,7 +4625,7 @@
           <a:p>
             <a:fld id="{CC3B8B2A-A9AF-4D9A-A1FB-4FC30B3F5934}" type="datetimeFigureOut">
               <a:rPr lang="en-US" smtClean="0"/>
-              <a:t>4/27/2015</a:t>
+              <a:t>5/17/2015</a:t>
             </a:fld>
             <a:endParaRPr lang="en-US"/>
           </a:p>
@@ -5326,7 +5327,7 @@
           <a:p>
             <a:fld id="{CC3B8B2A-A9AF-4D9A-A1FB-4FC30B3F5934}" type="datetimeFigureOut">
               <a:rPr lang="en-US" smtClean="0"/>
-              <a:t>4/27/2015</a:t>
+              <a:t>5/17/2015</a:t>
             </a:fld>
             <a:endParaRPr lang="en-US"/>
           </a:p>
@@ -5965,6 +5966,95 @@
           <a:lstStyle/>
           <a:p>
             <a:r>
+              <a:rPr lang="en-US" dirty="0"/>
+              <a:t>From JSON to </a:t>
+            </a:r>
+            <a:r>
+              <a:rPr lang="en-US" dirty="0" err="1"/>
+              <a:t>XMLtable</a:t>
+            </a:r>
+            <a:r>
+              <a:rPr lang="en-US" dirty="0"/>
+              <a:t> to Report</a:t>
+            </a:r>
+          </a:p>
+        </p:txBody>
+      </p:sp>
+      <p:pic>
+        <p:nvPicPr>
+          <p:cNvPr id="4" name="Content Placeholder 3"/>
+          <p:cNvPicPr>
+            <a:picLocks noGrp="1" noChangeAspect="1"/>
+          </p:cNvPicPr>
+          <p:nvPr>
+            <p:ph idx="1"/>
+          </p:nvPr>
+        </p:nvPicPr>
+        <p:blipFill>
+          <a:blip r:embed="rId2">
+            <a:extLst>
+              <a:ext uri="{28A0092B-C50C-407E-A947-70E740481C1C}">
+                <a14:useLocalDpi xmlns:a14="http://schemas.microsoft.com/office/drawing/2010/main" val="0"/>
+              </a:ext>
+            </a:extLst>
+          </a:blip>
+          <a:stretch>
+            <a:fillRect/>
+          </a:stretch>
+        </p:blipFill>
+        <p:spPr>
+          <a:xfrm>
+            <a:off x="677334" y="1930400"/>
+            <a:ext cx="8987171" cy="1790447"/>
+          </a:xfrm>
+        </p:spPr>
+      </p:pic>
+    </p:spTree>
+    <p:extLst>
+      <p:ext uri="{BB962C8B-B14F-4D97-AF65-F5344CB8AC3E}">
+        <p14:creationId xmlns:p14="http://schemas.microsoft.com/office/powerpoint/2010/main" val="1628199322"/>
+      </p:ext>
+    </p:extLst>
+  </p:cSld>
+  <p:clrMapOvr>
+    <a:masterClrMapping/>
+  </p:clrMapOvr>
+</p:sld>
+</file>
+
+<file path=ppt/slides/slide11.xml><?xml version="1.0" encoding="utf-8"?>
+<p:sld xmlns:a="http://schemas.openxmlformats.org/drawingml/2006/main" xmlns:r="http://schemas.openxmlformats.org/officeDocument/2006/relationships" xmlns:p="http://schemas.openxmlformats.org/presentationml/2006/main">
+  <p:cSld>
+    <p:spTree>
+      <p:nvGrpSpPr>
+        <p:cNvPr id="1" name=""/>
+        <p:cNvGrpSpPr/>
+        <p:nvPr/>
+      </p:nvGrpSpPr>
+      <p:grpSpPr>
+        <a:xfrm>
+          <a:off x="0" y="0"/>
+          <a:ext cx="0" cy="0"/>
+          <a:chOff x="0" y="0"/>
+          <a:chExt cx="0" cy="0"/>
+        </a:xfrm>
+      </p:grpSpPr>
+      <p:sp>
+        <p:nvSpPr>
+          <p:cNvPr id="2" name="Title 1"/>
+          <p:cNvSpPr>
+            <a:spLocks noGrp="1"/>
+          </p:cNvSpPr>
+          <p:nvPr>
+            <p:ph type="title"/>
+          </p:nvPr>
+        </p:nvSpPr>
+        <p:spPr/>
+        <p:txBody>
+          <a:bodyPr/>
+          <a:lstStyle/>
+          <a:p>
+            <a:r>
               <a:rPr lang="en-US" dirty="0" smtClean="0"/>
               <a:t>Rolling our own authentication</a:t>
             </a:r>
@@ -6071,7 +6161,7 @@
 </p:sld>
 </file>
 
-<file path=ppt/slides/slide11.xml><?xml version="1.0" encoding="utf-8"?>
+<file path=ppt/slides/slide12.xml><?xml version="1.0" encoding="utf-8"?>
 <p:sld xmlns:a="http://schemas.openxmlformats.org/drawingml/2006/main" xmlns:r="http://schemas.openxmlformats.org/officeDocument/2006/relationships" xmlns:p="http://schemas.openxmlformats.org/presentationml/2006/main">
   <p:cSld>
     <p:spTree>
@@ -6175,7 +6265,7 @@
 </p:sld>
 </file>
 
-<file path=ppt/slides/slide12.xml><?xml version="1.0" encoding="utf-8"?>
+<file path=ppt/slides/slide13.xml><?xml version="1.0" encoding="utf-8"?>
 <p:sld xmlns:a="http://schemas.openxmlformats.org/drawingml/2006/main" xmlns:r="http://schemas.openxmlformats.org/officeDocument/2006/relationships" xmlns:p="http://schemas.openxmlformats.org/presentationml/2006/main">
   <p:cSld>
     <p:spTree>
@@ -6284,8 +6374,16 @@
           <a:lstStyle/>
           <a:p>
             <a:r>
+              <a:rPr lang="en-US" smtClean="0"/>
+              <a:t>Application</a:t>
+            </a:r>
+            <a:r>
+              <a:rPr lang="en-US" smtClean="0"/>
+              <a:t> </a:t>
+            </a:r>
+            <a:r>
               <a:rPr lang="en-US" dirty="0" smtClean="0"/>
-              <a:t>Overview</a:t>
+              <a:t>URL</a:t>
             </a:r>
             <a:endParaRPr lang="en-US" dirty="0"/>
           </a:p>
@@ -6307,77 +6405,8 @@
           <a:lstStyle/>
           <a:p>
             <a:r>
-              <a:rPr lang="en-US" dirty="0" smtClean="0"/>
-              <a:t>Created </a:t>
-            </a:r>
-            <a:r>
-              <a:rPr lang="en-US" dirty="0" smtClean="0"/>
-              <a:t>an APEX application using a NoSQL </a:t>
-            </a:r>
-            <a:r>
-              <a:rPr lang="en-US" dirty="0" smtClean="0"/>
-              <a:t>database</a:t>
-            </a:r>
-            <a:endParaRPr lang="en-US" dirty="0" smtClean="0"/>
-          </a:p>
-          <a:p>
-            <a:pPr lvl="1"/>
-            <a:r>
-              <a:rPr lang="en-US" dirty="0" smtClean="0"/>
-              <a:t>Uses</a:t>
-            </a:r>
-            <a:r>
-              <a:rPr lang="en-US" dirty="0" smtClean="0"/>
-              <a:t> REST web </a:t>
-            </a:r>
-            <a:r>
-              <a:rPr lang="en-US" dirty="0" smtClean="0"/>
-              <a:t>service </a:t>
-            </a:r>
-            <a:r>
-              <a:rPr lang="en-US" dirty="0" smtClean="0"/>
-              <a:t>references</a:t>
-            </a:r>
-            <a:endParaRPr lang="en-US" dirty="0" smtClean="0"/>
-          </a:p>
-          <a:p>
-            <a:pPr lvl="2"/>
-            <a:r>
-              <a:rPr lang="en-US" dirty="0" smtClean="0"/>
-              <a:t>Needs </a:t>
-            </a:r>
-            <a:r>
-              <a:rPr lang="en-US" dirty="0" smtClean="0"/>
-              <a:t>access to a </a:t>
-            </a:r>
-            <a:r>
-              <a:rPr lang="en-US" dirty="0" smtClean="0"/>
-              <a:t>RESTful API</a:t>
-            </a:r>
-          </a:p>
-          <a:p>
-            <a:pPr lvl="3"/>
-            <a:r>
-              <a:rPr lang="en-US" dirty="0" smtClean="0"/>
-              <a:t>Needs a </a:t>
-            </a:r>
-            <a:r>
-              <a:rPr lang="en-US" dirty="0" smtClean="0"/>
-              <a:t>REST server</a:t>
-            </a:r>
-          </a:p>
-          <a:p>
-            <a:pPr lvl="4"/>
-            <a:r>
-              <a:rPr lang="en-US" dirty="0" smtClean="0"/>
-              <a:t>We set one up</a:t>
-            </a:r>
-            <a:endParaRPr lang="en-US" dirty="0" smtClean="0"/>
-          </a:p>
-          <a:p>
-            <a:r>
-              <a:rPr lang="en-US" dirty="0" smtClean="0"/>
-              <a:t>We have a real client!</a:t>
+              <a:rPr lang="en-US" dirty="0"/>
+              <a:t>https://apex.oracle.com/pls/apex/f?p=54058:1:103439119628502:::::</a:t>
             </a:r>
           </a:p>
         </p:txBody>
@@ -6385,7 +6414,7 @@
     </p:spTree>
     <p:extLst>
       <p:ext uri="{BB962C8B-B14F-4D97-AF65-F5344CB8AC3E}">
-        <p14:creationId xmlns:p14="http://schemas.microsoft.com/office/powerpoint/2010/main" val="1757583404"/>
+        <p14:creationId xmlns:p14="http://schemas.microsoft.com/office/powerpoint/2010/main" val="2546925048"/>
       </p:ext>
     </p:extLst>
   </p:cSld>
@@ -6429,7 +6458,7 @@
           <a:p>
             <a:r>
               <a:rPr lang="en-US" dirty="0" smtClean="0"/>
-              <a:t>The Stack</a:t>
+              <a:t>Overview</a:t>
             </a:r>
             <a:endParaRPr lang="en-US" dirty="0"/>
           </a:p>
@@ -6452,25 +6481,41 @@
           <a:p>
             <a:r>
               <a:rPr lang="en-US" dirty="0" smtClean="0"/>
-              <a:t>MongoDB (with Mongoose.js)</a:t>
-            </a:r>
-          </a:p>
-          <a:p>
+              <a:t>Created an APEX application using a NoSQL database</a:t>
+            </a:r>
+          </a:p>
+          <a:p>
+            <a:pPr lvl="1"/>
             <a:r>
               <a:rPr lang="en-US" dirty="0" smtClean="0"/>
-              <a:t>Express.js</a:t>
-            </a:r>
-          </a:p>
-          <a:p>
+              <a:t>Uses REST web service references</a:t>
+            </a:r>
+          </a:p>
+          <a:p>
+            <a:pPr lvl="2"/>
             <a:r>
               <a:rPr lang="en-US" dirty="0" smtClean="0"/>
-              <a:t>APEX</a:t>
-            </a:r>
-          </a:p>
-          <a:p>
+              <a:t>Needs access to a RESTful API</a:t>
+            </a:r>
+          </a:p>
+          <a:p>
+            <a:pPr lvl="3"/>
             <a:r>
               <a:rPr lang="en-US" dirty="0" smtClean="0"/>
-              <a:t>Node.js</a:t>
+              <a:t>Needs a REST server</a:t>
+            </a:r>
+          </a:p>
+          <a:p>
+            <a:pPr lvl="4"/>
+            <a:r>
+              <a:rPr lang="en-US" dirty="0" smtClean="0"/>
+              <a:t>We set one up</a:t>
+            </a:r>
+          </a:p>
+          <a:p>
+            <a:r>
+              <a:rPr lang="en-US" dirty="0" smtClean="0"/>
+              <a:t>We have a real client!</a:t>
             </a:r>
           </a:p>
         </p:txBody>
@@ -6478,7 +6523,7 @@
     </p:spTree>
     <p:extLst>
       <p:ext uri="{BB962C8B-B14F-4D97-AF65-F5344CB8AC3E}">
-        <p14:creationId xmlns:p14="http://schemas.microsoft.com/office/powerpoint/2010/main" val="3560473081"/>
+        <p14:creationId xmlns:p14="http://schemas.microsoft.com/office/powerpoint/2010/main" val="1757583404"/>
       </p:ext>
     </p:extLst>
   </p:cSld>
@@ -6522,6 +6567,99 @@
           <a:p>
             <a:r>
               <a:rPr lang="en-US" dirty="0" smtClean="0"/>
+              <a:t>The Stack</a:t>
+            </a:r>
+            <a:endParaRPr lang="en-US" dirty="0"/>
+          </a:p>
+        </p:txBody>
+      </p:sp>
+      <p:sp>
+        <p:nvSpPr>
+          <p:cNvPr id="3" name="Content Placeholder 2"/>
+          <p:cNvSpPr>
+            <a:spLocks noGrp="1"/>
+          </p:cNvSpPr>
+          <p:nvPr>
+            <p:ph idx="1"/>
+          </p:nvPr>
+        </p:nvSpPr>
+        <p:spPr/>
+        <p:txBody>
+          <a:bodyPr/>
+          <a:lstStyle/>
+          <a:p>
+            <a:r>
+              <a:rPr lang="en-US" dirty="0" smtClean="0"/>
+              <a:t>MongoDB (with Mongoose.js)</a:t>
+            </a:r>
+          </a:p>
+          <a:p>
+            <a:r>
+              <a:rPr lang="en-US" dirty="0" smtClean="0"/>
+              <a:t>Express.js</a:t>
+            </a:r>
+          </a:p>
+          <a:p>
+            <a:r>
+              <a:rPr lang="en-US" dirty="0" smtClean="0"/>
+              <a:t>APEX</a:t>
+            </a:r>
+          </a:p>
+          <a:p>
+            <a:r>
+              <a:rPr lang="en-US" dirty="0" smtClean="0"/>
+              <a:t>Node.js</a:t>
+            </a:r>
+          </a:p>
+        </p:txBody>
+      </p:sp>
+    </p:spTree>
+    <p:extLst>
+      <p:ext uri="{BB962C8B-B14F-4D97-AF65-F5344CB8AC3E}">
+        <p14:creationId xmlns:p14="http://schemas.microsoft.com/office/powerpoint/2010/main" val="3560473081"/>
+      </p:ext>
+    </p:extLst>
+  </p:cSld>
+  <p:clrMapOvr>
+    <a:masterClrMapping/>
+  </p:clrMapOvr>
+</p:sld>
+</file>
+
+<file path=ppt/slides/slide5.xml><?xml version="1.0" encoding="utf-8"?>
+<p:sld xmlns:a="http://schemas.openxmlformats.org/drawingml/2006/main" xmlns:r="http://schemas.openxmlformats.org/officeDocument/2006/relationships" xmlns:p="http://schemas.openxmlformats.org/presentationml/2006/main">
+  <p:cSld>
+    <p:spTree>
+      <p:nvGrpSpPr>
+        <p:cNvPr id="1" name=""/>
+        <p:cNvGrpSpPr/>
+        <p:nvPr/>
+      </p:nvGrpSpPr>
+      <p:grpSpPr>
+        <a:xfrm>
+          <a:off x="0" y="0"/>
+          <a:ext cx="0" cy="0"/>
+          <a:chOff x="0" y="0"/>
+          <a:chExt cx="0" cy="0"/>
+        </a:xfrm>
+      </p:grpSpPr>
+      <p:sp>
+        <p:nvSpPr>
+          <p:cNvPr id="2" name="Title 1"/>
+          <p:cNvSpPr>
+            <a:spLocks noGrp="1"/>
+          </p:cNvSpPr>
+          <p:nvPr>
+            <p:ph type="title"/>
+          </p:nvPr>
+        </p:nvSpPr>
+        <p:spPr/>
+        <p:txBody>
+          <a:bodyPr/>
+          <a:lstStyle/>
+          <a:p>
+            <a:r>
+              <a:rPr lang="en-US" dirty="0" smtClean="0"/>
               <a:t>Features</a:t>
             </a:r>
             <a:endParaRPr lang="en-US" dirty="0"/>
@@ -6695,7 +6833,7 @@
 </p:sld>
 </file>
 
-<file path=ppt/slides/slide5.xml><?xml version="1.0" encoding="utf-8"?>
+<file path=ppt/slides/slide6.xml><?xml version="1.0" encoding="utf-8"?>
 <p:sld xmlns:a="http://schemas.openxmlformats.org/drawingml/2006/main" xmlns:r="http://schemas.openxmlformats.org/officeDocument/2006/relationships" xmlns:p="http://schemas.openxmlformats.org/presentationml/2006/main">
   <p:cSld>
     <p:spTree>
@@ -6777,7 +6915,7 @@
 </p:sld>
 </file>
 
-<file path=ppt/slides/slide6.xml><?xml version="1.0" encoding="utf-8"?>
+<file path=ppt/slides/slide7.xml><?xml version="1.0" encoding="utf-8"?>
 <p:sld xmlns:a="http://schemas.openxmlformats.org/drawingml/2006/main" xmlns:r="http://schemas.openxmlformats.org/officeDocument/2006/relationships" xmlns:p="http://schemas.openxmlformats.org/presentationml/2006/main">
   <p:cSld>
     <p:spTree>
@@ -6858,112 +6996,6 @@
 </p:sld>
 </file>
 
-<file path=ppt/slides/slide7.xml><?xml version="1.0" encoding="utf-8"?>
-<p:sld xmlns:a="http://schemas.openxmlformats.org/drawingml/2006/main" xmlns:r="http://schemas.openxmlformats.org/officeDocument/2006/relationships" xmlns:p="http://schemas.openxmlformats.org/presentationml/2006/main">
-  <p:cSld>
-    <p:spTree>
-      <p:nvGrpSpPr>
-        <p:cNvPr id="1" name=""/>
-        <p:cNvGrpSpPr/>
-        <p:nvPr/>
-      </p:nvGrpSpPr>
-      <p:grpSpPr>
-        <a:xfrm>
-          <a:off x="0" y="0"/>
-          <a:ext cx="0" cy="0"/>
-          <a:chOff x="0" y="0"/>
-          <a:chExt cx="0" cy="0"/>
-        </a:xfrm>
-      </p:grpSpPr>
-      <p:sp>
-        <p:nvSpPr>
-          <p:cNvPr id="2" name="Title 1"/>
-          <p:cNvSpPr>
-            <a:spLocks noGrp="1"/>
-          </p:cNvSpPr>
-          <p:nvPr>
-            <p:ph type="title"/>
-          </p:nvPr>
-        </p:nvSpPr>
-        <p:spPr/>
-        <p:txBody>
-          <a:bodyPr/>
-          <a:lstStyle/>
-          <a:p>
-            <a:r>
-              <a:rPr lang="en-US" dirty="0" smtClean="0"/>
-              <a:t>Web Service Reference</a:t>
-            </a:r>
-            <a:r>
-              <a:rPr lang="en-US" dirty="0" smtClean="0"/>
-              <a:t>: GET</a:t>
-            </a:r>
-            <a:endParaRPr lang="en-US" dirty="0"/>
-          </a:p>
-        </p:txBody>
-      </p:sp>
-      <p:sp>
-        <p:nvSpPr>
-          <p:cNvPr id="3" name="Content Placeholder 2"/>
-          <p:cNvSpPr>
-            <a:spLocks noGrp="1"/>
-          </p:cNvSpPr>
-          <p:nvPr>
-            <p:ph idx="1"/>
-          </p:nvPr>
-        </p:nvSpPr>
-        <p:spPr/>
-        <p:txBody>
-          <a:bodyPr/>
-          <a:lstStyle/>
-          <a:p>
-            <a:r>
-              <a:rPr lang="en-US" dirty="0" smtClean="0"/>
-              <a:t>APEX app sends a request to the server</a:t>
-            </a:r>
-          </a:p>
-          <a:p>
-            <a:r>
-              <a:rPr lang="en-US" dirty="0" smtClean="0"/>
-              <a:t>The server responds with a JSON object</a:t>
-            </a:r>
-          </a:p>
-          <a:p>
-            <a:r>
-              <a:rPr lang="en-US" dirty="0" smtClean="0"/>
-              <a:t>APEX stores the response in a temporary collection</a:t>
-            </a:r>
-          </a:p>
-          <a:p>
-            <a:r>
-              <a:rPr lang="en-US" dirty="0" smtClean="0"/>
-              <a:t>APEX runs a PL/SQL procedure to turn the JSON into an </a:t>
-            </a:r>
-            <a:r>
-              <a:rPr lang="en-US" dirty="0" err="1" smtClean="0"/>
-              <a:t>XMLtable</a:t>
-            </a:r>
-            <a:r>
-              <a:rPr lang="en-US" dirty="0" smtClean="0"/>
-              <a:t> and then into a table on a report</a:t>
-            </a:r>
-            <a:endParaRPr lang="en-US" dirty="0"/>
-          </a:p>
-        </p:txBody>
-      </p:sp>
-    </p:spTree>
-    <p:extLst>
-      <p:ext uri="{BB962C8B-B14F-4D97-AF65-F5344CB8AC3E}">
-        <p14:creationId xmlns:p14="http://schemas.microsoft.com/office/powerpoint/2010/main" val="3590986388"/>
-      </p:ext>
-    </p:extLst>
-  </p:cSld>
-  <p:clrMapOvr>
-    <a:masterClrMapping/>
-  </p:clrMapOvr>
-</p:sld>
-</file>
-
 <file path=ppt/slides/slide8.xml><?xml version="1.0" encoding="utf-8"?>
 <p:sld xmlns:a="http://schemas.openxmlformats.org/drawingml/2006/main" xmlns:r="http://schemas.openxmlformats.org/officeDocument/2006/relationships" xmlns:p="http://schemas.openxmlformats.org/presentationml/2006/main">
   <p:cSld>
@@ -6998,7 +7030,48 @@
           <a:p>
             <a:r>
               <a:rPr lang="en-US" dirty="0" smtClean="0"/>
-              <a:t>From JSON to </a:t>
+              <a:t>Web Service Reference: GET</a:t>
+            </a:r>
+            <a:endParaRPr lang="en-US" dirty="0"/>
+          </a:p>
+        </p:txBody>
+      </p:sp>
+      <p:sp>
+        <p:nvSpPr>
+          <p:cNvPr id="3" name="Content Placeholder 2"/>
+          <p:cNvSpPr>
+            <a:spLocks noGrp="1"/>
+          </p:cNvSpPr>
+          <p:nvPr>
+            <p:ph idx="1"/>
+          </p:nvPr>
+        </p:nvSpPr>
+        <p:spPr/>
+        <p:txBody>
+          <a:bodyPr/>
+          <a:lstStyle/>
+          <a:p>
+            <a:r>
+              <a:rPr lang="en-US" dirty="0" smtClean="0"/>
+              <a:t>APEX app sends a request to the server</a:t>
+            </a:r>
+          </a:p>
+          <a:p>
+            <a:r>
+              <a:rPr lang="en-US" dirty="0" smtClean="0"/>
+              <a:t>The server responds with a JSON object</a:t>
+            </a:r>
+          </a:p>
+          <a:p>
+            <a:r>
+              <a:rPr lang="en-US" dirty="0" smtClean="0"/>
+              <a:t>APEX stores the response in a temporary collection</a:t>
+            </a:r>
+          </a:p>
+          <a:p>
+            <a:r>
+              <a:rPr lang="en-US" dirty="0" smtClean="0"/>
+              <a:t>APEX runs a PL/SQL procedure to turn the JSON into an </a:t>
             </a:r>
             <a:r>
               <a:rPr lang="en-US" dirty="0" err="1" smtClean="0"/>
@@ -7006,45 +7079,16 @@
             </a:r>
             <a:r>
               <a:rPr lang="en-US" dirty="0" smtClean="0"/>
-              <a:t> to Report</a:t>
+              <a:t> and then into a table on a report</a:t>
             </a:r>
             <a:endParaRPr lang="en-US" dirty="0"/>
           </a:p>
         </p:txBody>
       </p:sp>
-      <p:pic>
-        <p:nvPicPr>
-          <p:cNvPr id="7" name="Content Placeholder 6"/>
-          <p:cNvPicPr>
-            <a:picLocks noGrp="1" noChangeAspect="1"/>
-          </p:cNvPicPr>
-          <p:nvPr>
-            <p:ph idx="1"/>
-          </p:nvPr>
-        </p:nvPicPr>
-        <p:blipFill>
-          <a:blip r:embed="rId2">
-            <a:extLst>
-              <a:ext uri="{28A0092B-C50C-407E-A947-70E740481C1C}">
-                <a14:useLocalDpi xmlns:a14="http://schemas.microsoft.com/office/drawing/2010/main" val="0"/>
-              </a:ext>
-            </a:extLst>
-          </a:blip>
-          <a:stretch>
-            <a:fillRect/>
-          </a:stretch>
-        </p:blipFill>
-        <p:spPr>
-          <a:xfrm>
-            <a:off x="3217330" y="1594209"/>
-            <a:ext cx="3516675" cy="4755387"/>
-          </a:xfrm>
-        </p:spPr>
-      </p:pic>
     </p:spTree>
     <p:extLst>
       <p:ext uri="{BB962C8B-B14F-4D97-AF65-F5344CB8AC3E}">
-        <p14:creationId xmlns:p14="http://schemas.microsoft.com/office/powerpoint/2010/main" val="3908136593"/>
+        <p14:creationId xmlns:p14="http://schemas.microsoft.com/office/powerpoint/2010/main" val="3590986388"/>
       </p:ext>
     </p:extLst>
   </p:cSld>
@@ -7087,23 +7131,24 @@
           <a:lstStyle/>
           <a:p>
             <a:r>
-              <a:rPr lang="en-US" dirty="0"/>
+              <a:rPr lang="en-US" dirty="0" smtClean="0"/>
               <a:t>From JSON to </a:t>
             </a:r>
             <a:r>
-              <a:rPr lang="en-US" dirty="0" err="1"/>
+              <a:rPr lang="en-US" dirty="0" err="1" smtClean="0"/>
               <a:t>XMLtable</a:t>
             </a:r>
             <a:r>
-              <a:rPr lang="en-US" dirty="0"/>
+              <a:rPr lang="en-US" dirty="0" smtClean="0"/>
               <a:t> to Report</a:t>
             </a:r>
+            <a:endParaRPr lang="en-US" dirty="0"/>
           </a:p>
         </p:txBody>
       </p:sp>
       <p:pic>
         <p:nvPicPr>
-          <p:cNvPr id="4" name="Content Placeholder 3"/>
+          <p:cNvPr id="7" name="Content Placeholder 6"/>
           <p:cNvPicPr>
             <a:picLocks noGrp="1" noChangeAspect="1"/>
           </p:cNvPicPr>
@@ -7125,15 +7170,15 @@
         </p:blipFill>
         <p:spPr>
           <a:xfrm>
-            <a:off x="677334" y="1930400"/>
-            <a:ext cx="8987171" cy="1790447"/>
+            <a:off x="3217330" y="1594209"/>
+            <a:ext cx="3516675" cy="4755387"/>
           </a:xfrm>
         </p:spPr>
       </p:pic>
     </p:spTree>
     <p:extLst>
       <p:ext uri="{BB962C8B-B14F-4D97-AF65-F5344CB8AC3E}">
-        <p14:creationId xmlns:p14="http://schemas.microsoft.com/office/powerpoint/2010/main" val="1628199322"/>
+        <p14:creationId xmlns:p14="http://schemas.microsoft.com/office/powerpoint/2010/main" val="3908136593"/>
       </p:ext>
     </p:extLst>
   </p:cSld>

</xml_diff>